<commit_message>
Adapted User Needs and UI Design
System is now more user-focused. Example actibities have been removed. Habits/activites have been defined under three categories (Mindfulness, Physical Health & Social Wellbeing).
</commit_message>
<xml_diff>
--- a/UI Ideas.pptx
+++ b/UI Ideas.pptx
@@ -2574,9 +2574,33 @@
 <p:sldMaster xmlns:a="http://schemas.openxmlformats.org/drawingml/2006/main" xmlns:r="http://schemas.openxmlformats.org/officeDocument/2006/relationships" xmlns:p="http://schemas.openxmlformats.org/presentationml/2006/main">
   <p:cSld>
     <p:bg>
-      <p:bgRef idx="1001">
-        <a:schemeClr val="bg1"/>
-      </p:bgRef>
+      <p:bgPr>
+        <a:gradFill flip="none" rotWithShape="1">
+          <a:gsLst>
+            <a:gs pos="0">
+              <a:schemeClr val="accent1">
+                <a:tint val="66000"/>
+                <a:satMod val="160000"/>
+              </a:schemeClr>
+            </a:gs>
+            <a:gs pos="50000">
+              <a:schemeClr val="accent1">
+                <a:tint val="44500"/>
+                <a:satMod val="160000"/>
+              </a:schemeClr>
+            </a:gs>
+            <a:gs pos="100000">
+              <a:schemeClr val="accent1">
+                <a:tint val="23500"/>
+                <a:satMod val="160000"/>
+              </a:schemeClr>
+            </a:gs>
+          </a:gsLst>
+          <a:lin ang="5400000" scaled="0"/>
+          <a:tileRect/>
+        </a:gradFill>
+        <a:effectLst/>
+      </p:bgPr>
     </p:bg>
     <p:spTree>
       <p:nvGrpSpPr>
@@ -3211,11 +3235,7 @@
             <a:pPr algn="ctr"/>
             <a:r>
               <a:rPr lang="en-GB" sz="1200" dirty="0" smtClean="0"/>
-              <a:t>11:28                      </a:t>
-            </a:r>
-            <a:r>
-              <a:rPr lang="en-GB" sz="1200" dirty="0" smtClean="0"/>
-              <a:t>13/09/2020                      📅                      </a:t>
+              <a:t>11:28                      13/09/2020                      📅                      </a:t>
             </a:r>
             <a:r>
               <a:rPr lang="en-GB" sz="1200" b="1" dirty="0"/>
@@ -3356,10 +3376,7 @@
             <a:avLst/>
           </a:prstGeom>
           <a:solidFill>
-            <a:schemeClr val="accent1">
-              <a:lumMod val="60000"/>
-              <a:lumOff val="40000"/>
-            </a:schemeClr>
+            <a:srgbClr val="FFC000"/>
           </a:solidFill>
         </p:spPr>
         <p:style>
@@ -3712,11 +3729,7 @@
             <a:pPr algn="ctr"/>
             <a:r>
               <a:rPr lang="en-GB" sz="1200" dirty="0" smtClean="0"/>
-              <a:t>11:28                      </a:t>
-            </a:r>
-            <a:r>
-              <a:rPr lang="en-GB" sz="1200" dirty="0" smtClean="0"/>
-              <a:t>13/09/2020                      📅                      </a:t>
+              <a:t>11:28                      13/09/2020                      📅                      </a:t>
             </a:r>
             <a:r>
               <a:rPr lang="en-GB" sz="1200" b="1" dirty="0"/>
@@ -3857,10 +3870,7 @@
             <a:avLst/>
           </a:prstGeom>
           <a:solidFill>
-            <a:schemeClr val="accent1">
-              <a:lumMod val="60000"/>
-              <a:lumOff val="40000"/>
-            </a:schemeClr>
+            <a:srgbClr val="FFC000"/>
           </a:solidFill>
         </p:spPr>
         <p:style>
@@ -4158,11 +4168,7 @@
             <a:pPr algn="ctr"/>
             <a:r>
               <a:rPr lang="en-GB" sz="1200" dirty="0" smtClean="0"/>
-              <a:t>11:28                      </a:t>
-            </a:r>
-            <a:r>
-              <a:rPr lang="en-GB" sz="1200" dirty="0" smtClean="0"/>
-              <a:t>13/09/2020                      📅                      </a:t>
+              <a:t>11:28                      13/09/2020                      📅                      </a:t>
             </a:r>
             <a:r>
               <a:rPr lang="en-GB" sz="1200" b="1" dirty="0"/>
@@ -4303,10 +4309,7 @@
             <a:avLst/>
           </a:prstGeom>
           <a:solidFill>
-            <a:schemeClr val="accent1">
-              <a:lumMod val="60000"/>
-              <a:lumOff val="40000"/>
-            </a:schemeClr>
+            <a:srgbClr val="FFC000"/>
           </a:solidFill>
         </p:spPr>
         <p:style>
@@ -4556,8 +4559,8 @@
         </p:nvSpPr>
         <p:spPr>
           <a:xfrm>
-            <a:off x="6948264" y="897687"/>
-            <a:ext cx="2195736" cy="830997"/>
+            <a:off x="7236296" y="897687"/>
+            <a:ext cx="1800200" cy="1754326"/>
           </a:xfrm>
           <a:prstGeom prst="rect">
             <a:avLst/>
@@ -4572,20 +4575,37 @@
           <a:p>
             <a:r>
               <a:rPr lang="en-GB" sz="1200" dirty="0" smtClean="0"/>
-              <a:t>Inspiration = Examples</a:t>
-            </a:r>
-          </a:p>
-          <a:p>
+              <a:t>Inspiration = </a:t>
+            </a:r>
             <a:r>
               <a:rPr lang="en-GB" sz="1200" dirty="0" smtClean="0"/>
-              <a:t>Achievements </a:t>
-            </a:r>
+              <a:t>Examples</a:t>
+            </a:r>
+          </a:p>
+          <a:p>
+            <a:endParaRPr lang="en-GB" sz="1200" dirty="0" smtClean="0"/>
           </a:p>
           <a:p>
             <a:r>
               <a:rPr lang="en-GB" sz="1200" dirty="0" smtClean="0"/>
-              <a:t>About = What is this app? Me?</a:t>
-            </a:r>
+              <a:t>Achievements = Keeps users motivated </a:t>
+            </a:r>
+          </a:p>
+          <a:p>
+            <a:endParaRPr lang="en-GB" sz="1200" dirty="0" smtClean="0"/>
+          </a:p>
+          <a:p>
+            <a:r>
+              <a:rPr lang="en-GB" sz="1200" dirty="0" smtClean="0"/>
+              <a:t>About = What is this app? Me</a:t>
+            </a:r>
+            <a:r>
+              <a:rPr lang="en-GB" sz="1200" dirty="0" smtClean="0"/>
+              <a:t>?</a:t>
+            </a:r>
+          </a:p>
+          <a:p>
+            <a:endParaRPr lang="en-GB" sz="1200" dirty="0" smtClean="0"/>
           </a:p>
           <a:p>
             <a:r>

</xml_diff>

<commit_message>
UML Class Diagram & UI Tweaks
Created an object class diagram to help plan the relationship between Goals & Habits. Added scans of UI sketches and adapted some UI elements.
</commit_message>
<xml_diff>
--- a/UI Ideas.pptx
+++ b/UI Ideas.pptx
@@ -295,7 +295,7 @@
           <a:p>
             <a:fld id="{6C6399F9-48EB-4B19-B916-6516625928B8}" type="datetimeFigureOut">
               <a:rPr lang="en-GB" smtClean="0"/>
-              <a:t>14/09/2020</a:t>
+              <a:t>15/09/2020</a:t>
             </a:fld>
             <a:endParaRPr lang="en-GB"/>
           </a:p>
@@ -465,7 +465,7 @@
           <a:p>
             <a:fld id="{6C6399F9-48EB-4B19-B916-6516625928B8}" type="datetimeFigureOut">
               <a:rPr lang="en-GB" smtClean="0"/>
-              <a:t>14/09/2020</a:t>
+              <a:t>15/09/2020</a:t>
             </a:fld>
             <a:endParaRPr lang="en-GB"/>
           </a:p>
@@ -645,7 +645,7 @@
           <a:p>
             <a:fld id="{6C6399F9-48EB-4B19-B916-6516625928B8}" type="datetimeFigureOut">
               <a:rPr lang="en-GB" smtClean="0"/>
-              <a:t>14/09/2020</a:t>
+              <a:t>15/09/2020</a:t>
             </a:fld>
             <a:endParaRPr lang="en-GB"/>
           </a:p>
@@ -815,7 +815,7 @@
           <a:p>
             <a:fld id="{6C6399F9-48EB-4B19-B916-6516625928B8}" type="datetimeFigureOut">
               <a:rPr lang="en-GB" smtClean="0"/>
-              <a:t>14/09/2020</a:t>
+              <a:t>15/09/2020</a:t>
             </a:fld>
             <a:endParaRPr lang="en-GB"/>
           </a:p>
@@ -1061,7 +1061,7 @@
           <a:p>
             <a:fld id="{6C6399F9-48EB-4B19-B916-6516625928B8}" type="datetimeFigureOut">
               <a:rPr lang="en-GB" smtClean="0"/>
-              <a:t>14/09/2020</a:t>
+              <a:t>15/09/2020</a:t>
             </a:fld>
             <a:endParaRPr lang="en-GB"/>
           </a:p>
@@ -1349,7 +1349,7 @@
           <a:p>
             <a:fld id="{6C6399F9-48EB-4B19-B916-6516625928B8}" type="datetimeFigureOut">
               <a:rPr lang="en-GB" smtClean="0"/>
-              <a:t>14/09/2020</a:t>
+              <a:t>15/09/2020</a:t>
             </a:fld>
             <a:endParaRPr lang="en-GB"/>
           </a:p>
@@ -1771,7 +1771,7 @@
           <a:p>
             <a:fld id="{6C6399F9-48EB-4B19-B916-6516625928B8}" type="datetimeFigureOut">
               <a:rPr lang="en-GB" smtClean="0"/>
-              <a:t>14/09/2020</a:t>
+              <a:t>15/09/2020</a:t>
             </a:fld>
             <a:endParaRPr lang="en-GB"/>
           </a:p>
@@ -1889,7 +1889,7 @@
           <a:p>
             <a:fld id="{6C6399F9-48EB-4B19-B916-6516625928B8}" type="datetimeFigureOut">
               <a:rPr lang="en-GB" smtClean="0"/>
-              <a:t>14/09/2020</a:t>
+              <a:t>15/09/2020</a:t>
             </a:fld>
             <a:endParaRPr lang="en-GB"/>
           </a:p>
@@ -1984,7 +1984,7 @@
           <a:p>
             <a:fld id="{6C6399F9-48EB-4B19-B916-6516625928B8}" type="datetimeFigureOut">
               <a:rPr lang="en-GB" smtClean="0"/>
-              <a:t>14/09/2020</a:t>
+              <a:t>15/09/2020</a:t>
             </a:fld>
             <a:endParaRPr lang="en-GB"/>
           </a:p>
@@ -2261,7 +2261,7 @@
           <a:p>
             <a:fld id="{6C6399F9-48EB-4B19-B916-6516625928B8}" type="datetimeFigureOut">
               <a:rPr lang="en-GB" smtClean="0"/>
-              <a:t>14/09/2020</a:t>
+              <a:t>15/09/2020</a:t>
             </a:fld>
             <a:endParaRPr lang="en-GB"/>
           </a:p>
@@ -2514,7 +2514,7 @@
           <a:p>
             <a:fld id="{6C6399F9-48EB-4B19-B916-6516625928B8}" type="datetimeFigureOut">
               <a:rPr lang="en-GB" smtClean="0"/>
-              <a:t>14/09/2020</a:t>
+              <a:t>15/09/2020</a:t>
             </a:fld>
             <a:endParaRPr lang="en-GB"/>
           </a:p>
@@ -2751,7 +2751,7 @@
           <a:p>
             <a:fld id="{6C6399F9-48EB-4B19-B916-6516625928B8}" type="datetimeFigureOut">
               <a:rPr lang="en-GB" smtClean="0"/>
-              <a:t>14/09/2020</a:t>
+              <a:t>15/09/2020</a:t>
             </a:fld>
             <a:endParaRPr lang="en-GB"/>
           </a:p>
@@ -4659,11 +4659,7 @@
           <a:p>
             <a:r>
               <a:rPr lang="en-GB" dirty="0" smtClean="0"/>
-              <a:t>New </a:t>
-            </a:r>
-            <a:r>
-              <a:rPr lang="en-GB" dirty="0" smtClean="0"/>
-              <a:t>Iteration</a:t>
+              <a:t>New Iteration</a:t>
             </a:r>
             <a:endParaRPr lang="en-GB" dirty="0"/>
           </a:p>
@@ -5061,11 +5057,6 @@
               </a:rPr>
               <a:t>✔</a:t>
             </a:r>
-            <a:endParaRPr lang="en-GB" sz="1400" b="1" dirty="0">
-              <a:solidFill>
-                <a:srgbClr val="00B050"/>
-              </a:solidFill>
-            </a:endParaRPr>
           </a:p>
         </p:txBody>
       </p:sp>
@@ -5278,15 +5269,7 @@
                   <a:schemeClr val="tx1"/>
                 </a:solidFill>
               </a:rPr>
-              <a:t>   </a:t>
-            </a:r>
-            <a:r>
-              <a:rPr lang="en-GB" sz="1400" dirty="0" smtClean="0">
-                <a:solidFill>
-                  <a:schemeClr val="tx1"/>
-                </a:solidFill>
-              </a:rPr>
-              <a:t>🏆 </a:t>
+              <a:t>   🏆 </a:t>
             </a:r>
             <a:endParaRPr lang="en-GB" sz="1400" dirty="0">
               <a:solidFill>
@@ -5338,7 +5321,6 @@
               <a:rPr lang="en-GB" sz="1200" b="1" dirty="0" smtClean="0"/>
               <a:t>:</a:t>
             </a:r>
-            <a:endParaRPr lang="en-GB" sz="1200" b="1" dirty="0" smtClean="0"/>
           </a:p>
         </p:txBody>
       </p:sp>
@@ -5981,15 +5963,7 @@
                   <a:schemeClr val="tx1"/>
                 </a:solidFill>
               </a:rPr>
-              <a:t>   </a:t>
-            </a:r>
-            <a:r>
-              <a:rPr lang="en-GB" sz="1400" dirty="0" smtClean="0">
-                <a:solidFill>
-                  <a:schemeClr val="tx1"/>
-                </a:solidFill>
-              </a:rPr>
-              <a:t>🏆 </a:t>
+              <a:t>   🏆 </a:t>
             </a:r>
             <a:endParaRPr lang="en-GB" sz="1400" dirty="0">
               <a:solidFill>
@@ -6041,7 +6015,6 @@
               <a:rPr lang="en-GB" sz="1200" b="1" dirty="0" smtClean="0"/>
               <a:t>:</a:t>
             </a:r>
-            <a:endParaRPr lang="en-GB" sz="1200" b="1" dirty="0" smtClean="0"/>
           </a:p>
         </p:txBody>
       </p:sp>
@@ -6750,15 +6723,7 @@
                   <a:schemeClr val="tx1"/>
                 </a:solidFill>
               </a:rPr>
-              <a:t>   </a:t>
-            </a:r>
-            <a:r>
-              <a:rPr lang="en-GB" sz="1400" dirty="0" smtClean="0">
-                <a:solidFill>
-                  <a:schemeClr val="tx1"/>
-                </a:solidFill>
-              </a:rPr>
-              <a:t>🏆 </a:t>
+              <a:t>   🏆 </a:t>
             </a:r>
             <a:endParaRPr lang="en-GB" sz="1400" dirty="0">
               <a:solidFill>
@@ -6810,7 +6775,6 @@
               <a:rPr lang="en-GB" sz="1200" b="1" dirty="0" smtClean="0"/>
               <a:t>:</a:t>
             </a:r>
-            <a:endParaRPr lang="en-GB" sz="1200" b="1" dirty="0" smtClean="0"/>
           </a:p>
         </p:txBody>
       </p:sp>
@@ -6823,7 +6787,7 @@
         <p:spPr>
           <a:xfrm>
             <a:off x="24964" y="45512"/>
-            <a:ext cx="792088" cy="369332"/>
+            <a:ext cx="1018644" cy="923330"/>
           </a:xfrm>
           <a:prstGeom prst="rect">
             <a:avLst/>
@@ -6838,7 +6802,7 @@
           <a:p>
             <a:r>
               <a:rPr lang="en-GB" dirty="0" smtClean="0"/>
-              <a:t>Habits</a:t>
+              <a:t>Habits &amp; Settings Menu</a:t>
             </a:r>
             <a:endParaRPr lang="en-GB" dirty="0"/>
           </a:p>
@@ -7453,15 +7417,7 @@
                   <a:schemeClr val="tx1"/>
                 </a:solidFill>
               </a:rPr>
-              <a:t>   </a:t>
-            </a:r>
-            <a:r>
-              <a:rPr lang="en-GB" sz="1400" dirty="0" smtClean="0">
-                <a:solidFill>
-                  <a:schemeClr val="tx1"/>
-                </a:solidFill>
-              </a:rPr>
-              <a:t>🏆 </a:t>
+              <a:t>   🏆 </a:t>
             </a:r>
             <a:endParaRPr lang="en-GB" sz="1400" dirty="0">
               <a:solidFill>
@@ -7513,7 +7469,6 @@
               <a:rPr lang="en-GB" sz="1200" b="1" dirty="0" smtClean="0"/>
               <a:t>:</a:t>
             </a:r>
-            <a:endParaRPr lang="en-GB" sz="1200" b="1" dirty="0" smtClean="0"/>
           </a:p>
         </p:txBody>
       </p:sp>
@@ -7565,7 +7520,7 @@
                   <a:schemeClr val="tx1"/>
                 </a:solidFill>
               </a:rPr>
-              <a:t>Inspiration</a:t>
+              <a:t>&lt; Inspiration &gt;</a:t>
             </a:r>
             <a:endParaRPr lang="en-GB" dirty="0">
               <a:solidFill>

</xml_diff>